<commit_message>
update with more slides
</commit_message>
<xml_diff>
--- a/docs/dora_slides.pptx
+++ b/docs/dora_slides.pptx
@@ -13,9 +13,10 @@
     <p:sldId id="269" r:id="rId7"/>
     <p:sldId id="262" r:id="rId8"/>
     <p:sldId id="267" r:id="rId9"/>
-    <p:sldId id="268" r:id="rId10"/>
-    <p:sldId id="270" r:id="rId11"/>
-    <p:sldId id="271" r:id="rId12"/>
+    <p:sldId id="272" r:id="rId10"/>
+    <p:sldId id="268" r:id="rId11"/>
+    <p:sldId id="270" r:id="rId12"/>
+    <p:sldId id="271" r:id="rId13"/>
   </p:sldIdLst>
   <p:sldSz cx="12192000" cy="6858000"/>
   <p:notesSz cx="6858000" cy="9144000"/>
@@ -6637,6 +6638,136 @@
 </p:sld>
 </file>
 
+<file path=ppt/slides/slide10.xml><?xml version="1.0" encoding="utf-8"?>
+<p:sld xmlns:a="http://schemas.openxmlformats.org/drawingml/2006/main" xmlns:r="http://schemas.openxmlformats.org/officeDocument/2006/relationships" xmlns:p="http://schemas.openxmlformats.org/presentationml/2006/main">
+  <p:cSld>
+    <p:spTree>
+      <p:nvGrpSpPr>
+        <p:cNvPr id="1" name=""/>
+        <p:cNvGrpSpPr/>
+        <p:nvPr/>
+      </p:nvGrpSpPr>
+      <p:grpSpPr>
+        <a:xfrm>
+          <a:off x="0" y="0"/>
+          <a:ext cx="0" cy="0"/>
+          <a:chOff x="0" y="0"/>
+          <a:chExt cx="0" cy="0"/>
+        </a:xfrm>
+      </p:grpSpPr>
+      <p:sp>
+        <p:nvSpPr>
+          <p:cNvPr id="2" name="Content Placeholder 1">
+            <a:extLst>
+              <a:ext uri="{FF2B5EF4-FFF2-40B4-BE49-F238E27FC236}">
+                <a16:creationId xmlns:a16="http://schemas.microsoft.com/office/drawing/2014/main" id="{B1209481-48CF-284C-A47E-9DA840C12098}"/>
+              </a:ext>
+            </a:extLst>
+          </p:cNvPr>
+          <p:cNvSpPr>
+            <a:spLocks noGrp="1"/>
+          </p:cNvSpPr>
+          <p:nvPr>
+            <p:ph sz="half" idx="2"/>
+          </p:nvPr>
+        </p:nvSpPr>
+        <p:spPr>
+          <a:xfrm>
+            <a:off x="914400" y="1605691"/>
+            <a:ext cx="5181600" cy="4351338"/>
+          </a:xfrm>
+        </p:spPr>
+        <p:txBody>
+          <a:bodyPr/>
+          <a:lstStyle/>
+          <a:p>
+            <a:r>
+              <a:rPr lang="en-US" dirty="0"/>
+              <a:t>Demo for showcasing</a:t>
+            </a:r>
+          </a:p>
+        </p:txBody>
+      </p:sp>
+      <p:sp>
+        <p:nvSpPr>
+          <p:cNvPr id="3" name="Title 2">
+            <a:extLst>
+              <a:ext uri="{FF2B5EF4-FFF2-40B4-BE49-F238E27FC236}">
+                <a16:creationId xmlns:a16="http://schemas.microsoft.com/office/drawing/2014/main" id="{06FE5A82-C78F-6544-A895-0CA7C0347951}"/>
+              </a:ext>
+            </a:extLst>
+          </p:cNvPr>
+          <p:cNvSpPr>
+            <a:spLocks noGrp="1"/>
+          </p:cNvSpPr>
+          <p:nvPr>
+            <p:ph type="title"/>
+          </p:nvPr>
+        </p:nvSpPr>
+        <p:spPr/>
+        <p:txBody>
+          <a:bodyPr/>
+          <a:lstStyle/>
+          <a:p>
+            <a:r>
+              <a:rPr lang="en-US" dirty="0"/>
+              <a:t>Visualization Tool</a:t>
+            </a:r>
+          </a:p>
+        </p:txBody>
+      </p:sp>
+      <p:sp>
+        <p:nvSpPr>
+          <p:cNvPr id="5" name="Footer Placeholder 4">
+            <a:extLst>
+              <a:ext uri="{FF2B5EF4-FFF2-40B4-BE49-F238E27FC236}">
+                <a16:creationId xmlns:a16="http://schemas.microsoft.com/office/drawing/2014/main" id="{5AC88BB0-7336-1E4D-B58F-9F375D79BAB4}"/>
+              </a:ext>
+            </a:extLst>
+          </p:cNvPr>
+          <p:cNvSpPr>
+            <a:spLocks noGrp="1"/>
+          </p:cNvSpPr>
+          <p:nvPr>
+            <p:ph type="ftr" sz="quarter" idx="3"/>
+          </p:nvPr>
+        </p:nvSpPr>
+        <p:spPr/>
+        <p:txBody>
+          <a:bodyPr/>
+          <a:lstStyle/>
+          <a:p>
+            <a:r>
+              <a:rPr lang="en-US"/>
+              <a:t>Use, duplication or disclosure of this document or any of the information or images contained herein is subject to the restrictions on the title page of this document. </a:t>
+            </a:r>
+          </a:p>
+          <a:p>
+            <a:r>
+              <a:rPr lang="en-US"/>
+              <a:t>COPYRIGHT ©2020 </a:t>
+            </a:r>
+            <a:r>
+              <a:rPr lang="en-CA"/>
+              <a:t>MacDonald, Dettwiler and Associates Inc. (MDA). </a:t>
+            </a:r>
+            <a:endParaRPr lang="en-US" dirty="0"/>
+          </a:p>
+        </p:txBody>
+      </p:sp>
+    </p:spTree>
+    <p:extLst>
+      <p:ext uri="{BB962C8B-B14F-4D97-AF65-F5344CB8AC3E}">
+        <p14:creationId xmlns:p14="http://schemas.microsoft.com/office/powerpoint/2010/main" val="309285417"/>
+      </p:ext>
+    </p:extLst>
+  </p:cSld>
+  <p:clrMapOvr>
+    <a:masterClrMapping/>
+  </p:clrMapOvr>
+</p:sld>
+</file>
+
 <file path=ppt/slides/slide2.xml><?xml version="1.0" encoding="utf-8"?>
 <p:sld xmlns:a="http://schemas.openxmlformats.org/drawingml/2006/main" xmlns:r="http://schemas.openxmlformats.org/officeDocument/2006/relationships" xmlns:p="http://schemas.openxmlformats.org/presentationml/2006/main">
   <p:cSld>
@@ -6813,10 +6944,10 @@
       </p:sp>
       <p:pic>
         <p:nvPicPr>
-          <p:cNvPr id="3" name="Picture 2" descr="A close up of a logo&#10;&#10;Description automatically generated">
+          <p:cNvPr id="8" name="Picture 7" descr="A close up of a logo&#10;&#10;Description automatically generated">
             <a:extLst>
               <a:ext uri="{FF2B5EF4-FFF2-40B4-BE49-F238E27FC236}">
-                <a16:creationId xmlns:a16="http://schemas.microsoft.com/office/drawing/2014/main" id="{3D7A3A6D-5D3F-5741-A907-4B29E1C8D6B0}"/>
+                <a16:creationId xmlns:a16="http://schemas.microsoft.com/office/drawing/2014/main" id="{213D26CF-F880-BA49-831C-0A3DF05369F0}"/>
               </a:ext>
             </a:extLst>
           </p:cNvPr>
@@ -6839,8 +6970,8 @@
         </p:blipFill>
         <p:spPr>
           <a:xfrm>
-            <a:off x="3175154" y="2839999"/>
-            <a:ext cx="5525933" cy="3287580"/>
+            <a:off x="4700540" y="1666794"/>
+            <a:ext cx="7491460" cy="4456945"/>
           </a:xfrm>
           <a:prstGeom prst="rect">
             <a:avLst/>
@@ -7242,6 +7373,42 @@
           </a:p>
         </p:txBody>
       </p:sp>
+      <p:pic>
+        <p:nvPicPr>
+          <p:cNvPr id="5" name="Picture 4" descr="A screenshot of a cell phone&#10;&#10;Description automatically generated">
+            <a:extLst>
+              <a:ext uri="{FF2B5EF4-FFF2-40B4-BE49-F238E27FC236}">
+                <a16:creationId xmlns:a16="http://schemas.microsoft.com/office/drawing/2014/main" id="{259FA625-5092-414C-A966-A2D194FE57C0}"/>
+              </a:ext>
+            </a:extLst>
+          </p:cNvPr>
+          <p:cNvPicPr>
+            <a:picLocks noChangeAspect="1"/>
+          </p:cNvPicPr>
+          <p:nvPr/>
+        </p:nvPicPr>
+        <p:blipFill>
+          <a:blip r:embed="rId2">
+            <a:extLst>
+              <a:ext uri="{28A0092B-C50C-407E-A947-70E740481C1C}">
+                <a14:useLocalDpi xmlns:a14="http://schemas.microsoft.com/office/drawing/2010/main" val="0"/>
+              </a:ext>
+            </a:extLst>
+          </a:blip>
+          <a:stretch>
+            <a:fillRect/>
+          </a:stretch>
+        </p:blipFill>
+        <p:spPr>
+          <a:xfrm>
+            <a:off x="5678366" y="558269"/>
+            <a:ext cx="5723060" cy="5741462"/>
+          </a:xfrm>
+          <a:prstGeom prst="rect">
+            <a:avLst/>
+          </a:prstGeom>
+        </p:spPr>
+      </p:pic>
     </p:spTree>
     <p:extLst>
       <p:ext uri="{BB962C8B-B14F-4D97-AF65-F5344CB8AC3E}">
@@ -7328,29 +7495,39 @@
           <a:p>
             <a:r>
               <a:rPr lang="en-US" dirty="0"/>
-              <a:t>Total 9 metrics</a:t>
+              <a:t>Total 9 evaluation metrics</a:t>
             </a:r>
           </a:p>
           <a:p>
             <a:r>
               <a:rPr lang="en-US" dirty="0"/>
-              <a:t>N-gram based metrics</a:t>
+              <a:t>N-gram based metrics: Used in research papers</a:t>
             </a:r>
           </a:p>
           <a:p>
             <a:pPr lvl="1"/>
             <a:r>
               <a:rPr lang="en-US" dirty="0"/>
-              <a:t>Bleu 1-4, Rouge L, </a:t>
-            </a:r>
+              <a:t>Bleu 1-4</a:t>
+            </a:r>
+          </a:p>
+          <a:p>
+            <a:pPr lvl="1"/>
+            <a:r>
+              <a:rPr lang="en-US" dirty="0"/>
+              <a:t>Rouge L </a:t>
+            </a:r>
+          </a:p>
+          <a:p>
+            <a:pPr lvl="1"/>
             <a:r>
               <a:rPr lang="en-US" dirty="0" err="1"/>
               <a:t>Meteror</a:t>
             </a:r>
-            <a:r>
-              <a:rPr lang="en-US" dirty="0"/>
-              <a:t>, </a:t>
-            </a:r>
+            <a:endParaRPr lang="en-US" dirty="0"/>
+          </a:p>
+          <a:p>
+            <a:pPr lvl="1"/>
             <a:r>
               <a:rPr lang="en-US" dirty="0" err="1"/>
               <a:t>CIDEr</a:t>
@@ -7358,26 +7535,9 @@
             <a:endParaRPr lang="en-US" dirty="0"/>
           </a:p>
           <a:p>
-            <a:pPr lvl="1"/>
-            <a:r>
-              <a:rPr lang="en-US" dirty="0"/>
-              <a:t>Used in research papers</a:t>
-            </a:r>
-          </a:p>
-          <a:p>
-            <a:r>
-              <a:rPr lang="en-US" dirty="0"/>
-              <a:t>Semantic-based metrics: </a:t>
-            </a:r>
-          </a:p>
-          <a:p>
-            <a:pPr lvl="1"/>
-            <a:r>
-              <a:rPr lang="en-US" dirty="0"/>
-              <a:t>SPICE, Universal Sentence Encoder Similarity</a:t>
-            </a:r>
-          </a:p>
-          <a:p>
+            <a:pPr marL="0" indent="0">
+              <a:buNone/>
+            </a:pPr>
             <a:endParaRPr lang="en-US" dirty="0"/>
           </a:p>
         </p:txBody>
@@ -7456,6 +7616,178 @@
           <p:cNvPr id="3" name="Title 2">
             <a:extLst>
               <a:ext uri="{FF2B5EF4-FFF2-40B4-BE49-F238E27FC236}">
+                <a16:creationId xmlns:a16="http://schemas.microsoft.com/office/drawing/2014/main" id="{080A15B5-E576-B747-B007-A72F3777A4B5}"/>
+              </a:ext>
+            </a:extLst>
+          </p:cNvPr>
+          <p:cNvSpPr>
+            <a:spLocks noGrp="1"/>
+          </p:cNvSpPr>
+          <p:nvPr>
+            <p:ph type="title"/>
+          </p:nvPr>
+        </p:nvSpPr>
+        <p:spPr/>
+        <p:txBody>
+          <a:bodyPr/>
+          <a:lstStyle/>
+          <a:p>
+            <a:r>
+              <a:rPr lang="en-US" dirty="0"/>
+              <a:t>Deep Learning Model: Evaluation Metrics</a:t>
+            </a:r>
+          </a:p>
+        </p:txBody>
+      </p:sp>
+      <p:sp>
+        <p:nvSpPr>
+          <p:cNvPr id="4" name="Content Placeholder 3">
+            <a:extLst>
+              <a:ext uri="{FF2B5EF4-FFF2-40B4-BE49-F238E27FC236}">
+                <a16:creationId xmlns:a16="http://schemas.microsoft.com/office/drawing/2014/main" id="{208FB8C0-31AA-A248-B300-33329EFE891B}"/>
+              </a:ext>
+            </a:extLst>
+          </p:cNvPr>
+          <p:cNvSpPr>
+            <a:spLocks noGrp="1"/>
+          </p:cNvSpPr>
+          <p:nvPr>
+            <p:ph sz="half" idx="13"/>
+          </p:nvPr>
+        </p:nvSpPr>
+        <p:spPr/>
+        <p:txBody>
+          <a:bodyPr/>
+          <a:lstStyle/>
+          <a:p>
+            <a:r>
+              <a:rPr lang="en-US" dirty="0"/>
+              <a:t>Semantic-based metrics: </a:t>
+            </a:r>
+          </a:p>
+          <a:p>
+            <a:pPr lvl="1"/>
+            <a:r>
+              <a:rPr lang="en-US" dirty="0"/>
+              <a:t>SPICE: scene graph</a:t>
+            </a:r>
+          </a:p>
+          <a:p>
+            <a:pPr lvl="1"/>
+            <a:r>
+              <a:rPr lang="en-US" dirty="0"/>
+              <a:t>Universal Sentence Encoder Similarity</a:t>
+            </a:r>
+          </a:p>
+          <a:p>
+            <a:endParaRPr lang="en-US" dirty="0"/>
+          </a:p>
+        </p:txBody>
+      </p:sp>
+      <p:sp>
+        <p:nvSpPr>
+          <p:cNvPr id="5" name="Footer Placeholder 4">
+            <a:extLst>
+              <a:ext uri="{FF2B5EF4-FFF2-40B4-BE49-F238E27FC236}">
+                <a16:creationId xmlns:a16="http://schemas.microsoft.com/office/drawing/2014/main" id="{27546011-A305-C840-80B3-181DE9DE0892}"/>
+              </a:ext>
+            </a:extLst>
+          </p:cNvPr>
+          <p:cNvSpPr>
+            <a:spLocks noGrp="1"/>
+          </p:cNvSpPr>
+          <p:nvPr>
+            <p:ph type="ftr" sz="quarter" idx="3"/>
+          </p:nvPr>
+        </p:nvSpPr>
+        <p:spPr/>
+        <p:txBody>
+          <a:bodyPr/>
+          <a:lstStyle/>
+          <a:p>
+            <a:r>
+              <a:rPr lang="en-US"/>
+              <a:t>Use, duplication or disclosure of this document or any of the information or images contained herein is subject to the restrictions on the title page of this document. </a:t>
+            </a:r>
+          </a:p>
+          <a:p>
+            <a:r>
+              <a:rPr lang="en-US"/>
+              <a:t>COPYRIGHT ©2020 </a:t>
+            </a:r>
+            <a:r>
+              <a:rPr lang="en-CA"/>
+              <a:t>MacDonald, Dettwiler and Associates Inc. (MDA). </a:t>
+            </a:r>
+            <a:endParaRPr lang="en-US" dirty="0"/>
+          </a:p>
+        </p:txBody>
+      </p:sp>
+      <p:pic>
+        <p:nvPicPr>
+          <p:cNvPr id="6" name="Picture 5">
+            <a:extLst>
+              <a:ext uri="{FF2B5EF4-FFF2-40B4-BE49-F238E27FC236}">
+                <a16:creationId xmlns:a16="http://schemas.microsoft.com/office/drawing/2014/main" id="{CC009A8B-C648-5645-862D-E70E3D599938}"/>
+              </a:ext>
+            </a:extLst>
+          </p:cNvPr>
+          <p:cNvPicPr>
+            <a:picLocks noChangeAspect="1"/>
+          </p:cNvPicPr>
+          <p:nvPr/>
+        </p:nvPicPr>
+        <p:blipFill>
+          <a:blip r:embed="rId2"/>
+          <a:stretch>
+            <a:fillRect/>
+          </a:stretch>
+        </p:blipFill>
+        <p:spPr>
+          <a:xfrm>
+            <a:off x="6120674" y="1287064"/>
+            <a:ext cx="5397500" cy="3200400"/>
+          </a:xfrm>
+          <a:prstGeom prst="rect">
+            <a:avLst/>
+          </a:prstGeom>
+        </p:spPr>
+      </p:pic>
+    </p:spTree>
+    <p:extLst>
+      <p:ext uri="{BB962C8B-B14F-4D97-AF65-F5344CB8AC3E}">
+        <p14:creationId xmlns:p14="http://schemas.microsoft.com/office/powerpoint/2010/main" val="3996265033"/>
+      </p:ext>
+    </p:extLst>
+  </p:cSld>
+  <p:clrMapOvr>
+    <a:masterClrMapping/>
+  </p:clrMapOvr>
+</p:sld>
+</file>
+
+<file path=ppt/slides/slide8.xml><?xml version="1.0" encoding="utf-8"?>
+<p:sld xmlns:a="http://schemas.openxmlformats.org/drawingml/2006/main" xmlns:r="http://schemas.openxmlformats.org/officeDocument/2006/relationships" xmlns:p="http://schemas.openxmlformats.org/presentationml/2006/main">
+  <p:cSld>
+    <p:spTree>
+      <p:nvGrpSpPr>
+        <p:cNvPr id="1" name=""/>
+        <p:cNvGrpSpPr/>
+        <p:nvPr/>
+      </p:nvGrpSpPr>
+      <p:grpSpPr>
+        <a:xfrm>
+          <a:off x="0" y="0"/>
+          <a:ext cx="0" cy="0"/>
+          <a:chOff x="0" y="0"/>
+          <a:chExt cx="0" cy="0"/>
+        </a:xfrm>
+      </p:grpSpPr>
+      <p:sp>
+        <p:nvSpPr>
+          <p:cNvPr id="3" name="Title 2">
+            <a:extLst>
+              <a:ext uri="{FF2B5EF4-FFF2-40B4-BE49-F238E27FC236}">
                 <a16:creationId xmlns:a16="http://schemas.microsoft.com/office/drawing/2014/main" id="{37CB70C5-7591-C74F-A4AB-A523831576C4}"/>
               </a:ext>
             </a:extLst>
@@ -7511,13 +7843,37 @@
             </a:r>
           </a:p>
           <a:p>
+            <a:pPr lvl="1"/>
+            <a:r>
+              <a:rPr lang="en-US" dirty="0"/>
+              <a:t>Train </a:t>
+            </a:r>
+          </a:p>
+          <a:p>
+            <a:pPr lvl="1"/>
+            <a:r>
+              <a:rPr lang="en-US" dirty="0"/>
+              <a:t>Generate Caption</a:t>
+            </a:r>
+          </a:p>
+          <a:p>
+            <a:pPr lvl="1"/>
+            <a:r>
+              <a:rPr lang="en-US" dirty="0"/>
+              <a:t>Evaluate</a:t>
+            </a:r>
+          </a:p>
+          <a:p>
+            <a:r>
+              <a:rPr lang="en-US" dirty="0"/>
+              <a:t>Save trained model, model results and score back to database</a:t>
+            </a:r>
+          </a:p>
+          <a:p>
             <a:r>
               <a:rPr lang="en-US" dirty="0"/>
               <a:t>Future Improvements</a:t>
             </a:r>
-          </a:p>
-          <a:p>
-            <a:endParaRPr lang="en-US" dirty="0"/>
           </a:p>
           <a:p>
             <a:endParaRPr lang="en-US" dirty="0"/>
@@ -7576,7 +7932,7 @@
 </p:sld>
 </file>
 
-<file path=ppt/slides/slide8.xml><?xml version="1.0" encoding="utf-8"?>
+<file path=ppt/slides/slide9.xml><?xml version="1.0" encoding="utf-8"?>
 <p:sld xmlns:a="http://schemas.openxmlformats.org/drawingml/2006/main" xmlns:r="http://schemas.openxmlformats.org/officeDocument/2006/relationships" xmlns:p="http://schemas.openxmlformats.org/presentationml/2006/main">
   <p:cSld>
     <p:spTree>
@@ -7738,136 +8094,6 @@
     <p:extLst>
       <p:ext uri="{BB962C8B-B14F-4D97-AF65-F5344CB8AC3E}">
         <p14:creationId xmlns:p14="http://schemas.microsoft.com/office/powerpoint/2010/main" val="3899776595"/>
-      </p:ext>
-    </p:extLst>
-  </p:cSld>
-  <p:clrMapOvr>
-    <a:masterClrMapping/>
-  </p:clrMapOvr>
-</p:sld>
-</file>
-
-<file path=ppt/slides/slide9.xml><?xml version="1.0" encoding="utf-8"?>
-<p:sld xmlns:a="http://schemas.openxmlformats.org/drawingml/2006/main" xmlns:r="http://schemas.openxmlformats.org/officeDocument/2006/relationships" xmlns:p="http://schemas.openxmlformats.org/presentationml/2006/main">
-  <p:cSld>
-    <p:spTree>
-      <p:nvGrpSpPr>
-        <p:cNvPr id="1" name=""/>
-        <p:cNvGrpSpPr/>
-        <p:nvPr/>
-      </p:nvGrpSpPr>
-      <p:grpSpPr>
-        <a:xfrm>
-          <a:off x="0" y="0"/>
-          <a:ext cx="0" cy="0"/>
-          <a:chOff x="0" y="0"/>
-          <a:chExt cx="0" cy="0"/>
-        </a:xfrm>
-      </p:grpSpPr>
-      <p:sp>
-        <p:nvSpPr>
-          <p:cNvPr id="2" name="Content Placeholder 1">
-            <a:extLst>
-              <a:ext uri="{FF2B5EF4-FFF2-40B4-BE49-F238E27FC236}">
-                <a16:creationId xmlns:a16="http://schemas.microsoft.com/office/drawing/2014/main" id="{B1209481-48CF-284C-A47E-9DA840C12098}"/>
-              </a:ext>
-            </a:extLst>
-          </p:cNvPr>
-          <p:cNvSpPr>
-            <a:spLocks noGrp="1"/>
-          </p:cNvSpPr>
-          <p:nvPr>
-            <p:ph sz="half" idx="2"/>
-          </p:nvPr>
-        </p:nvSpPr>
-        <p:spPr>
-          <a:xfrm>
-            <a:off x="914400" y="1605691"/>
-            <a:ext cx="5181600" cy="4351338"/>
-          </a:xfrm>
-        </p:spPr>
-        <p:txBody>
-          <a:bodyPr/>
-          <a:lstStyle/>
-          <a:p>
-            <a:r>
-              <a:rPr lang="en-US" dirty="0"/>
-              <a:t>Demo for showcasing</a:t>
-            </a:r>
-          </a:p>
-        </p:txBody>
-      </p:sp>
-      <p:sp>
-        <p:nvSpPr>
-          <p:cNvPr id="3" name="Title 2">
-            <a:extLst>
-              <a:ext uri="{FF2B5EF4-FFF2-40B4-BE49-F238E27FC236}">
-                <a16:creationId xmlns:a16="http://schemas.microsoft.com/office/drawing/2014/main" id="{06FE5A82-C78F-6544-A895-0CA7C0347951}"/>
-              </a:ext>
-            </a:extLst>
-          </p:cNvPr>
-          <p:cNvSpPr>
-            <a:spLocks noGrp="1"/>
-          </p:cNvSpPr>
-          <p:nvPr>
-            <p:ph type="title"/>
-          </p:nvPr>
-        </p:nvSpPr>
-        <p:spPr/>
-        <p:txBody>
-          <a:bodyPr/>
-          <a:lstStyle/>
-          <a:p>
-            <a:r>
-              <a:rPr lang="en-US" dirty="0"/>
-              <a:t>Visualization Tool</a:t>
-            </a:r>
-          </a:p>
-        </p:txBody>
-      </p:sp>
-      <p:sp>
-        <p:nvSpPr>
-          <p:cNvPr id="5" name="Footer Placeholder 4">
-            <a:extLst>
-              <a:ext uri="{FF2B5EF4-FFF2-40B4-BE49-F238E27FC236}">
-                <a16:creationId xmlns:a16="http://schemas.microsoft.com/office/drawing/2014/main" id="{5AC88BB0-7336-1E4D-B58F-9F375D79BAB4}"/>
-              </a:ext>
-            </a:extLst>
-          </p:cNvPr>
-          <p:cNvSpPr>
-            <a:spLocks noGrp="1"/>
-          </p:cNvSpPr>
-          <p:nvPr>
-            <p:ph type="ftr" sz="quarter" idx="3"/>
-          </p:nvPr>
-        </p:nvSpPr>
-        <p:spPr/>
-        <p:txBody>
-          <a:bodyPr/>
-          <a:lstStyle/>
-          <a:p>
-            <a:r>
-              <a:rPr lang="en-US"/>
-              <a:t>Use, duplication or disclosure of this document or any of the information or images contained herein is subject to the restrictions on the title page of this document. </a:t>
-            </a:r>
-          </a:p>
-          <a:p>
-            <a:r>
-              <a:rPr lang="en-US"/>
-              <a:t>COPYRIGHT ©2020 </a:t>
-            </a:r>
-            <a:r>
-              <a:rPr lang="en-CA"/>
-              <a:t>MacDonald, Dettwiler and Associates Inc. (MDA). </a:t>
-            </a:r>
-            <a:endParaRPr lang="en-US" dirty="0"/>
-          </a:p>
-        </p:txBody>
-      </p:sp>
-    </p:spTree>
-    <p:extLst>
-      <p:ext uri="{BB962C8B-B14F-4D97-AF65-F5344CB8AC3E}">
-        <p14:creationId xmlns:p14="http://schemas.microsoft.com/office/powerpoint/2010/main" val="309285417"/>
       </p:ext>
     </p:extLst>
   </p:cSld>

</xml_diff>